<commit_message>
Slide updates and added an example.
</commit_message>
<xml_diff>
--- a/Slides/1007Recitation.pptx
+++ b/Slides/1007Recitation.pptx
@@ -5,7 +5,7 @@
     <p:sldMasterId id="2147483648" r:id="rId1"/>
   </p:sldMasterIdLst>
   <p:notesMasterIdLst>
-    <p:notesMasterId r:id="rId16"/>
+    <p:notesMasterId r:id="rId17"/>
   </p:notesMasterIdLst>
   <p:sldIdLst>
     <p:sldId id="256" r:id="rId2"/>
@@ -19,9 +19,10 @@
     <p:sldId id="285" r:id="rId10"/>
     <p:sldId id="299" r:id="rId11"/>
     <p:sldId id="284" r:id="rId12"/>
-    <p:sldId id="281" r:id="rId13"/>
-    <p:sldId id="282" r:id="rId14"/>
-    <p:sldId id="274" r:id="rId15"/>
+    <p:sldId id="300" r:id="rId13"/>
+    <p:sldId id="281" r:id="rId14"/>
+    <p:sldId id="282" r:id="rId15"/>
+    <p:sldId id="274" r:id="rId16"/>
   </p:sldIdLst>
   <p:sldSz cx="12192000" cy="6858000"/>
   <p:notesSz cx="6858000" cy="9144000"/>
@@ -6991,7 +6992,7 @@
           <p:cNvPr id="2" name="Title 1">
             <a:extLst>
               <a:ext uri="{FF2B5EF4-FFF2-40B4-BE49-F238E27FC236}">
-                <a16:creationId xmlns:a16="http://schemas.microsoft.com/office/drawing/2014/main" id="{F30273BE-5C43-4080-BA09-89BB709EB197}"/>
+                <a16:creationId xmlns:a16="http://schemas.microsoft.com/office/drawing/2014/main" id="{3089B501-2034-3144-99D5-CC85A75230AB}"/>
               </a:ext>
             </a:extLst>
           </p:cNvPr>
@@ -7009,7 +7010,7 @@
           <a:p>
             <a:r>
               <a:rPr lang="en-US" dirty="0"/>
-              <a:t>Lab 4 Part 1</a:t>
+              <a:t>Scoping Blocks</a:t>
             </a:r>
           </a:p>
         </p:txBody>
@@ -7019,7 +7020,7 @@
           <p:cNvPr id="3" name="Content Placeholder 2">
             <a:extLst>
               <a:ext uri="{FF2B5EF4-FFF2-40B4-BE49-F238E27FC236}">
-                <a16:creationId xmlns:a16="http://schemas.microsoft.com/office/drawing/2014/main" id="{DF5200C7-F36C-4BC8-8ABB-D30487D0689A}"/>
+                <a16:creationId xmlns:a16="http://schemas.microsoft.com/office/drawing/2014/main" id="{134917BE-E8B1-9F47-ACA5-1B2A37105DCF}"/>
               </a:ext>
             </a:extLst>
           </p:cNvPr>
@@ -7037,41 +7038,51 @@
           <a:p>
             <a:r>
               <a:rPr lang="en-US" dirty="0"/>
-              <a:t>This is a longer one… don’t freak out if you end up with 100+ lines and lots of print statements!</a:t>
-            </a:r>
-          </a:p>
-          <a:p>
-            <a:r>
-              <a:rPr lang="en-US" dirty="0"/>
-              <a:t>You will </a:t>
-            </a:r>
-            <a:r>
-              <a:rPr lang="en-US" b="1" dirty="0"/>
-              <a:t>not </a:t>
-            </a:r>
-            <a:r>
-              <a:rPr lang="en-US" dirty="0"/>
-              <a:t>use loops in this part of the lab, just if-structures </a:t>
-            </a:r>
-          </a:p>
-          <a:p>
-            <a:r>
-              <a:rPr lang="en-US" dirty="0"/>
-              <a:t>Pay attention to how the user could possibly input things; String methods will be your friend here</a:t>
-            </a:r>
-          </a:p>
-          <a:p>
-            <a:r>
-              <a:rPr lang="en-US" dirty="0"/>
-              <a:t>DO NOT hard-code in the user’s answer to the quiz. You’ll need to use the scanner class to actually take user input! </a:t>
-            </a:r>
-          </a:p>
-        </p:txBody>
-      </p:sp>
+              <a:t>Variables declared in main can be seen anywhere in the main method.</a:t>
+            </a:r>
+          </a:p>
+          <a:p>
+            <a:r>
+              <a:rPr lang="en-US" dirty="0"/>
+              <a:t>Variables declared in loops and if statements can only be seen in those loops and if statements.</a:t>
+            </a:r>
+          </a:p>
+        </p:txBody>
+      </p:sp>
+      <p:pic>
+        <p:nvPicPr>
+          <p:cNvPr id="5" name="Picture 4" descr="Text&#10;&#10;Description automatically generated">
+            <a:extLst>
+              <a:ext uri="{FF2B5EF4-FFF2-40B4-BE49-F238E27FC236}">
+                <a16:creationId xmlns:a16="http://schemas.microsoft.com/office/drawing/2014/main" id="{968D236F-7E91-C647-B275-7E8B7611C1BA}"/>
+              </a:ext>
+            </a:extLst>
+          </p:cNvPr>
+          <p:cNvPicPr>
+            <a:picLocks noChangeAspect="1"/>
+          </p:cNvPicPr>
+          <p:nvPr/>
+        </p:nvPicPr>
+        <p:blipFill>
+          <a:blip r:embed="rId2"/>
+          <a:stretch>
+            <a:fillRect/>
+          </a:stretch>
+        </p:blipFill>
+        <p:spPr>
+          <a:xfrm>
+            <a:off x="646111" y="4037412"/>
+            <a:ext cx="11225048" cy="2578840"/>
+          </a:xfrm>
+          <a:prstGeom prst="rect">
+            <a:avLst/>
+          </a:prstGeom>
+        </p:spPr>
+      </p:pic>
     </p:spTree>
     <p:extLst>
       <p:ext uri="{BB962C8B-B14F-4D97-AF65-F5344CB8AC3E}">
-        <p14:creationId xmlns:p14="http://schemas.microsoft.com/office/powerpoint/2010/main" val="1775227187"/>
+        <p14:creationId xmlns:p14="http://schemas.microsoft.com/office/powerpoint/2010/main" val="2953630518"/>
       </p:ext>
     </p:extLst>
   </p:cSld>
@@ -7103,6 +7114,118 @@
           <p:cNvPr id="2" name="Title 1">
             <a:extLst>
               <a:ext uri="{FF2B5EF4-FFF2-40B4-BE49-F238E27FC236}">
+                <a16:creationId xmlns:a16="http://schemas.microsoft.com/office/drawing/2014/main" id="{F30273BE-5C43-4080-BA09-89BB709EB197}"/>
+              </a:ext>
+            </a:extLst>
+          </p:cNvPr>
+          <p:cNvSpPr>
+            <a:spLocks noGrp="1"/>
+          </p:cNvSpPr>
+          <p:nvPr>
+            <p:ph type="title"/>
+          </p:nvPr>
+        </p:nvSpPr>
+        <p:spPr/>
+        <p:txBody>
+          <a:bodyPr/>
+          <a:lstStyle/>
+          <a:p>
+            <a:r>
+              <a:rPr lang="en-US" dirty="0"/>
+              <a:t>Lab 4 Part 1</a:t>
+            </a:r>
+          </a:p>
+        </p:txBody>
+      </p:sp>
+      <p:sp>
+        <p:nvSpPr>
+          <p:cNvPr id="3" name="Content Placeholder 2">
+            <a:extLst>
+              <a:ext uri="{FF2B5EF4-FFF2-40B4-BE49-F238E27FC236}">
+                <a16:creationId xmlns:a16="http://schemas.microsoft.com/office/drawing/2014/main" id="{DF5200C7-F36C-4BC8-8ABB-D30487D0689A}"/>
+              </a:ext>
+            </a:extLst>
+          </p:cNvPr>
+          <p:cNvSpPr>
+            <a:spLocks noGrp="1"/>
+          </p:cNvSpPr>
+          <p:nvPr>
+            <p:ph idx="1"/>
+          </p:nvPr>
+        </p:nvSpPr>
+        <p:spPr/>
+        <p:txBody>
+          <a:bodyPr/>
+          <a:lstStyle/>
+          <a:p>
+            <a:r>
+              <a:rPr lang="en-US" dirty="0"/>
+              <a:t>This is a longer one… don’t freak out if you end up with 100+ lines and lots of print statements!</a:t>
+            </a:r>
+          </a:p>
+          <a:p>
+            <a:r>
+              <a:rPr lang="en-US" dirty="0"/>
+              <a:t>You will </a:t>
+            </a:r>
+            <a:r>
+              <a:rPr lang="en-US" b="1" dirty="0"/>
+              <a:t>not </a:t>
+            </a:r>
+            <a:r>
+              <a:rPr lang="en-US" dirty="0"/>
+              <a:t>use loops in this part of the lab, just if-structures </a:t>
+            </a:r>
+          </a:p>
+          <a:p>
+            <a:r>
+              <a:rPr lang="en-US" dirty="0"/>
+              <a:t>Pay attention to how the user could possibly input things; String methods will be your friend here</a:t>
+            </a:r>
+          </a:p>
+          <a:p>
+            <a:r>
+              <a:rPr lang="en-US" dirty="0"/>
+              <a:t>DO NOT hard-code in the user’s answer to the quiz. You’ll need to use the scanner class to actually take user input! </a:t>
+            </a:r>
+          </a:p>
+        </p:txBody>
+      </p:sp>
+    </p:spTree>
+    <p:extLst>
+      <p:ext uri="{BB962C8B-B14F-4D97-AF65-F5344CB8AC3E}">
+        <p14:creationId xmlns:p14="http://schemas.microsoft.com/office/powerpoint/2010/main" val="1775227187"/>
+      </p:ext>
+    </p:extLst>
+  </p:cSld>
+  <p:clrMapOvr>
+    <a:masterClrMapping/>
+  </p:clrMapOvr>
+</p:sld>
+</file>
+
+<file path=ppt/slides/slide14.xml><?xml version="1.0" encoding="utf-8"?>
+<p:sld xmlns:a="http://schemas.openxmlformats.org/drawingml/2006/main" xmlns:r="http://schemas.openxmlformats.org/officeDocument/2006/relationships" xmlns:p="http://schemas.openxmlformats.org/presentationml/2006/main">
+  <p:cSld>
+    <p:spTree>
+      <p:nvGrpSpPr>
+        <p:cNvPr id="1" name=""/>
+        <p:cNvGrpSpPr/>
+        <p:nvPr/>
+      </p:nvGrpSpPr>
+      <p:grpSpPr>
+        <a:xfrm>
+          <a:off x="0" y="0"/>
+          <a:ext cx="0" cy="0"/>
+          <a:chOff x="0" y="0"/>
+          <a:chExt cx="0" cy="0"/>
+        </a:xfrm>
+      </p:grpSpPr>
+      <p:sp>
+        <p:nvSpPr>
+          <p:cNvPr id="2" name="Title 1">
+            <a:extLst>
+              <a:ext uri="{FF2B5EF4-FFF2-40B4-BE49-F238E27FC236}">
                 <a16:creationId xmlns:a16="http://schemas.microsoft.com/office/drawing/2014/main" id="{573882EF-2F36-401C-89BC-4E9D5E35ECC4}"/>
               </a:ext>
             </a:extLst>
@@ -7218,7 +7341,7 @@
 </p:sld>
 </file>
 
-<file path=ppt/slides/slide14.xml><?xml version="1.0" encoding="utf-8"?>
+<file path=ppt/slides/slide15.xml><?xml version="1.0" encoding="utf-8"?>
 <p:sld xmlns:a="http://schemas.openxmlformats.org/drawingml/2006/main" xmlns:r="http://schemas.openxmlformats.org/officeDocument/2006/relationships" xmlns:p="http://schemas.openxmlformats.org/presentationml/2006/main">
   <p:cSld>
     <p:spTree>
@@ -7448,6 +7571,12 @@
             <a:r>
               <a:rPr lang="en-US" dirty="0"/>
               <a:t>For loops</a:t>
+            </a:r>
+          </a:p>
+          <a:p>
+            <a:r>
+              <a:rPr lang="en-US" dirty="0"/>
+              <a:t>Scoping Blocks</a:t>
             </a:r>
           </a:p>
           <a:p>

</xml_diff>